<commit_message>
Added PCA and adjusted Slide 7
</commit_message>
<xml_diff>
--- a/AML Project 3.pptx
+++ b/AML Project 3.pptx
@@ -1498,7 +1498,7 @@
         </p:nvSpPr>
         <p:spPr bwMode="auto">
           <a:xfrm>
-            <a:off x="381300" y="685800"/>
+            <a:off x="381000" y="685800"/>
             <a:ext cx="6096000" cy="3429000"/>
           </a:xfrm>
           <a:custGeom>
@@ -1562,7 +1562,36 @@
               <a:buNone/>
               <a:defRPr/>
             </a:pPr>
-            <a:endParaRPr/>
+            <a:r>
+              <a:rPr lang="en-US" dirty="0"/>
+              <a:t>The photo is of the results from the KNN mapped version</a:t>
+            </a:r>
+          </a:p>
+          <a:p>
+            <a:pPr marL="0" lvl="0" indent="0" algn="l">
+              <a:spcBef>
+                <a:spcPts val="0"/>
+              </a:spcBef>
+              <a:spcAft>
+                <a:spcPts val="0"/>
+              </a:spcAft>
+              <a:buNone/>
+              <a:defRPr/>
+            </a:pPr>
+            <a:endParaRPr lang="en-US" dirty="0"/>
+          </a:p>
+          <a:p>
+            <a:pPr marL="0" lvl="0" indent="0" algn="l">
+              <a:spcBef>
+                <a:spcPts val="0"/>
+              </a:spcBef>
+              <a:spcAft>
+                <a:spcPts val="0"/>
+              </a:spcAft>
+              <a:buNone/>
+              <a:defRPr/>
+            </a:pPr>
+            <a:endParaRPr dirty="0"/>
           </a:p>
         </p:txBody>
       </p:sp>
@@ -10035,10 +10064,129 @@
               <a:buNone/>
               <a:defRPr/>
             </a:pPr>
-            <a:endParaRPr/>
+            <a:r>
+              <a:rPr lang="en-US" dirty="0"/>
+              <a:t>Based on the confusion matrix among other data we know</a:t>
+            </a:r>
+          </a:p>
+          <a:p>
+            <a:pPr marL="742950" lvl="1" indent="-285750">
+              <a:spcAft>
+                <a:spcPts val="1200"/>
+              </a:spcAft>
+              <a:defRPr/>
+            </a:pPr>
+            <a:r>
+              <a:rPr lang="en-US" sz="1600" dirty="0"/>
+              <a:t>The Selected attributes of the data are the best for predicting eclipse types</a:t>
+            </a:r>
+          </a:p>
+          <a:p>
+            <a:pPr marL="742950" lvl="1" indent="-285750">
+              <a:spcAft>
+                <a:spcPts val="1200"/>
+              </a:spcAft>
+              <a:defRPr/>
+            </a:pPr>
+            <a:r>
+              <a:rPr lang="en-US" sz="1600" dirty="0"/>
+              <a:t>There is minimal overfitting/ underfitting in our training model</a:t>
+            </a:r>
+          </a:p>
+          <a:p>
+            <a:pPr marL="457200" lvl="1" indent="0">
+              <a:spcAft>
+                <a:spcPts val="1200"/>
+              </a:spcAft>
+              <a:buNone/>
+              <a:defRPr/>
+            </a:pPr>
+            <a:endParaRPr lang="en-US" sz="1600" dirty="0"/>
+          </a:p>
+          <a:p>
+            <a:pPr marL="0" indent="0">
+              <a:spcAft>
+                <a:spcPts val="1200"/>
+              </a:spcAft>
+              <a:buNone/>
+              <a:defRPr/>
+            </a:pPr>
+            <a:r>
+              <a:rPr lang="en-US" sz="1800" dirty="0"/>
+              <a:t>The PCA shows the grouping of the data when transformed to two groups</a:t>
+            </a:r>
+          </a:p>
+          <a:p>
+            <a:pPr marL="742950" lvl="1" indent="-285750">
+              <a:spcAft>
+                <a:spcPts val="1200"/>
+              </a:spcAft>
+              <a:defRPr/>
+            </a:pPr>
+            <a:endParaRPr lang="en-US" sz="1600" dirty="0"/>
           </a:p>
         </p:txBody>
       </p:sp>
+      <p:pic>
+        <p:nvPicPr>
+          <p:cNvPr id="4" name="Picture 3" descr="A screenshot of a number matrix&#10;&#10;Description automatically generated">
+            <a:extLst>
+              <a:ext uri="{FF2B5EF4-FFF2-40B4-BE49-F238E27FC236}">
+                <a16:creationId xmlns:a16="http://schemas.microsoft.com/office/drawing/2014/main" id="{37C1B0D9-64A8-538C-D891-C966AB541B03}"/>
+              </a:ext>
+            </a:extLst>
+          </p:cNvPr>
+          <p:cNvPicPr>
+            <a:picLocks noChangeAspect="1"/>
+          </p:cNvPicPr>
+          <p:nvPr/>
+        </p:nvPicPr>
+        <p:blipFill>
+          <a:blip r:embed="rId3"/>
+          <a:stretch>
+            <a:fillRect/>
+          </a:stretch>
+        </p:blipFill>
+        <p:spPr bwMode="auto">
+          <a:xfrm>
+            <a:off x="829876" y="1473077"/>
+            <a:ext cx="2235867" cy="1617055"/>
+          </a:xfrm>
+          <a:prstGeom prst="rect">
+            <a:avLst/>
+          </a:prstGeom>
+        </p:spPr>
+      </p:pic>
+      <p:pic>
+        <p:nvPicPr>
+          <p:cNvPr id="6" name="Picture 5" descr="A diagram of a diagram with colored dots&#10;&#10;Description automatically generated">
+            <a:extLst>
+              <a:ext uri="{FF2B5EF4-FFF2-40B4-BE49-F238E27FC236}">
+                <a16:creationId xmlns:a16="http://schemas.microsoft.com/office/drawing/2014/main" id="{E8A08116-4D86-D137-ECB9-19DF83B2C4DB}"/>
+              </a:ext>
+            </a:extLst>
+          </p:cNvPr>
+          <p:cNvPicPr>
+            <a:picLocks noChangeAspect="1"/>
+          </p:cNvPicPr>
+          <p:nvPr/>
+        </p:nvPicPr>
+        <p:blipFill>
+          <a:blip r:embed="rId4"/>
+          <a:stretch>
+            <a:fillRect/>
+          </a:stretch>
+        </p:blipFill>
+        <p:spPr>
+          <a:xfrm>
+            <a:off x="829876" y="3150673"/>
+            <a:ext cx="2235867" cy="1823221"/>
+          </a:xfrm>
+          <a:prstGeom prst="rect">
+            <a:avLst/>
+          </a:prstGeom>
+        </p:spPr>
+      </p:pic>
     </p:spTree>
   </p:cSld>
   <p:clrMapOvr>

</xml_diff>